<commit_message>
update demo html structure
</commit_message>
<xml_diff>
--- a/docs/CSS.pptx
+++ b/docs/CSS.pptx
@@ -17277,33 +17277,37 @@
           <a:lstStyle/>
           <a:p>
             <a:r>
+              <a:rPr lang="en-US" dirty="0" smtClean="0">
+                <a:hlinkClick r:id="rId2"/>
+              </a:rPr>
+              <a:t>https</a:t>
+            </a:r>
+            <a:r>
               <a:rPr lang="en-US" dirty="0">
                 <a:hlinkClick r:id="rId2"/>
               </a:rPr>
-              <a:t>https://developer.mozilla.org/en-US/docs/Learn/HTML</a:t>
-            </a:r>
-            <a:endParaRPr lang="vi-VN" dirty="0" smtClean="0">
-              <a:hlinkClick r:id="rId3"/>
-            </a:endParaRPr>
-          </a:p>
-          <a:p>
+              <a:t>://</a:t>
+            </a:r>
+            <a:r>
+              <a:rPr lang="en-US" dirty="0" smtClean="0">
+                <a:hlinkClick r:id="rId2"/>
+              </a:rPr>
+              <a:t>developer.mozilla.org/en-US/docs/Learn/CSS/First_steps/How_CSS_is_structured</a:t>
+            </a:r>
+            <a:endParaRPr lang="vi-VN" dirty="0" smtClean="0"/>
+          </a:p>
+          <a:p>
+            <a:r>
+              <a:rPr lang="en-US" dirty="0">
+                <a:hlinkClick r:id="rId3"/>
+              </a:rPr>
+              <a:t>https://</a:t>
+            </a:r>
             <a:r>
               <a:rPr lang="en-US" dirty="0" smtClean="0">
                 <a:hlinkClick r:id="rId3"/>
               </a:rPr>
-              <a:t>https</a:t>
-            </a:r>
-            <a:r>
-              <a:rPr lang="en-US" dirty="0">
-                <a:hlinkClick r:id="rId3"/>
-              </a:rPr>
-              <a:t>://</a:t>
-            </a:r>
-            <a:r>
-              <a:rPr lang="en-US" dirty="0" smtClean="0">
-                <a:hlinkClick r:id="rId3"/>
-              </a:rPr>
-              <a:t>developer.mozilla.org/en-US/docs/Learn/CSS/First_steps/How_CSS_is_structured</a:t>
+              <a:t>www.w3schools.com/css</a:t>
             </a:r>
             <a:endParaRPr lang="vi-VN" dirty="0" smtClean="0"/>
           </a:p>
@@ -17318,31 +17322,7 @@
               <a:rPr lang="en-US" dirty="0" smtClean="0">
                 <a:hlinkClick r:id="rId4"/>
               </a:rPr>
-              <a:t>www.w3schools.com/css</a:t>
-            </a:r>
-            <a:endParaRPr lang="vi-VN" dirty="0" smtClean="0"/>
-          </a:p>
-          <a:p>
-            <a:r>
-              <a:rPr lang="en-US" dirty="0">
-                <a:hlinkClick r:id="rId5"/>
-              </a:rPr>
-              <a:t>https://</a:t>
-            </a:r>
-            <a:r>
-              <a:rPr lang="en-US" dirty="0" smtClean="0">
-                <a:hlinkClick r:id="rId5"/>
-              </a:rPr>
               <a:t>www.learn-html.org</a:t>
-            </a:r>
-            <a:endParaRPr lang="vi-VN" dirty="0" smtClean="0"/>
-          </a:p>
-          <a:p>
-            <a:r>
-              <a:rPr lang="en-US" dirty="0">
-                <a:hlinkClick r:id="rId6"/>
-              </a:rPr>
-              <a:t>https://techmaster.vn/posts/35050/co-gi-moi-trong-html5</a:t>
             </a:r>
             <a:endParaRPr lang="en-US" dirty="0"/>
           </a:p>
@@ -19715,6 +19695,62 @@
           <a:bodyPr/>
           <a:lstStyle/>
           <a:p>
+            <a:r>
+              <a:rPr lang="vi-VN" dirty="0" smtClean="0"/>
+              <a:t>Implement below form</a:t>
+            </a:r>
+          </a:p>
+          <a:p>
+            <a:endParaRPr lang="vi-VN" dirty="0"/>
+          </a:p>
+          <a:p>
+            <a:endParaRPr lang="vi-VN" dirty="0" smtClean="0"/>
+          </a:p>
+          <a:p>
+            <a:endParaRPr lang="vi-VN" dirty="0"/>
+          </a:p>
+          <a:p>
+            <a:endParaRPr lang="vi-VN" dirty="0" smtClean="0"/>
+          </a:p>
+          <a:p>
+            <a:endParaRPr lang="vi-VN" dirty="0"/>
+          </a:p>
+          <a:p>
+            <a:endParaRPr lang="vi-VN" dirty="0" smtClean="0"/>
+          </a:p>
+          <a:p>
+            <a:r>
+              <a:rPr lang="vi-VN" dirty="0"/>
+              <a:t>Demo: </a:t>
+            </a:r>
+            <a:endParaRPr lang="vi-VN" dirty="0" smtClean="0"/>
+          </a:p>
+          <a:p>
+            <a:pPr lvl="1"/>
+            <a:r>
+              <a:rPr lang="vi-VN" dirty="0" smtClean="0">
+                <a:hlinkClick r:id="rId2"/>
+              </a:rPr>
+              <a:t>https</a:t>
+            </a:r>
+            <a:r>
+              <a:rPr lang="vi-VN" dirty="0">
+                <a:hlinkClick r:id="rId2"/>
+              </a:rPr>
+              <a:t>://</a:t>
+            </a:r>
+            <a:r>
+              <a:rPr lang="vi-VN" dirty="0" smtClean="0">
+                <a:hlinkClick r:id="rId2"/>
+              </a:rPr>
+              <a:t>github.com/giaule91/basic-html.git</a:t>
+            </a:r>
+            <a:endParaRPr lang="vi-VN" dirty="0" smtClean="0"/>
+          </a:p>
+          <a:p>
+            <a:pPr marL="95250" indent="0">
+              <a:buNone/>
+            </a:pPr>
             <a:endParaRPr lang="en-US" dirty="0"/>
           </a:p>
         </p:txBody>
@@ -19728,7 +19764,7 @@
           <p:nvPr/>
         </p:nvPicPr>
         <p:blipFill>
-          <a:blip r:embed="rId2">
+          <a:blip r:embed="rId3">
             <a:extLst>
               <a:ext uri="{28A0092B-C50C-407E-A947-70E740481C1C}">
                 <a14:useLocalDpi xmlns:a14="http://schemas.microsoft.com/office/drawing/2010/main" val="0"/>
@@ -19741,8 +19777,8 @@
         </p:blipFill>
         <p:spPr>
           <a:xfrm>
-            <a:off x="1295400" y="971550"/>
-            <a:ext cx="5980227" cy="3845848"/>
+            <a:off x="3810000" y="1581150"/>
+            <a:ext cx="4034043" cy="2594269"/>
           </a:xfrm>
           <a:prstGeom prst="rect">
             <a:avLst/>

</xml_diff>